<commit_message>
fixed and delete things
</commit_message>
<xml_diff>
--- a/PowerPoints/Time Complexity.pptx
+++ b/PowerPoints/Time Complexity.pptx
@@ -288,7 +288,7 @@
           <a:p>
             <a:fld id="{ED291B17-9318-49DB-B28B-6E5994AE9581}" type="datetime1">
               <a:rPr lang="en-US" smtClean="0"/>
-              <a:t>9/22/20</a:t>
+              <a:t>8/8/22</a:t>
             </a:fld>
             <a:endParaRPr lang="en-US" dirty="0"/>
           </a:p>
@@ -486,7 +486,7 @@
           <a:p>
             <a:fld id="{2CED4963-E985-44C4-B8C4-FDD613B7C2F8}" type="datetime1">
               <a:rPr lang="en-US" smtClean="0"/>
-              <a:t>9/22/20</a:t>
+              <a:t>8/8/22</a:t>
             </a:fld>
             <a:endParaRPr lang="en-US" dirty="0"/>
           </a:p>
@@ -694,7 +694,7 @@
           <a:p>
             <a:fld id="{ED291B17-9318-49DB-B28B-6E5994AE9581}" type="datetime1">
               <a:rPr lang="en-US" smtClean="0"/>
-              <a:t>9/22/20</a:t>
+              <a:t>8/8/22</a:t>
             </a:fld>
             <a:endParaRPr lang="en-US" dirty="0"/>
           </a:p>
@@ -892,7 +892,7 @@
           <a:p>
             <a:fld id="{78DD82B9-B8EE-4375-B6FF-88FA6ABB15D9}" type="datetime1">
               <a:rPr lang="en-US" smtClean="0"/>
-              <a:t>9/22/20</a:t>
+              <a:t>8/8/22</a:t>
             </a:fld>
             <a:endParaRPr lang="en-US" dirty="0"/>
           </a:p>
@@ -1167,7 +1167,7 @@
           <a:p>
             <a:fld id="{B2497495-0637-405E-AE64-5CC7506D51F5}" type="datetime1">
               <a:rPr lang="en-US" smtClean="0"/>
-              <a:t>9/22/20</a:t>
+              <a:t>8/8/22</a:t>
             </a:fld>
             <a:endParaRPr lang="en-US" dirty="0"/>
           </a:p>
@@ -1432,7 +1432,7 @@
           <a:p>
             <a:fld id="{7BFFD690-9426-415D-8B65-26881E07B2D4}" type="datetime1">
               <a:rPr lang="en-US" smtClean="0"/>
-              <a:t>9/22/20</a:t>
+              <a:t>8/8/22</a:t>
             </a:fld>
             <a:endParaRPr lang="en-US" dirty="0"/>
           </a:p>
@@ -1844,7 +1844,7 @@
           <a:p>
             <a:fld id="{ED291B17-9318-49DB-B28B-6E5994AE9581}" type="datetime1">
               <a:rPr lang="en-US" smtClean="0"/>
-              <a:t>9/22/20</a:t>
+              <a:t>8/8/22</a:t>
             </a:fld>
             <a:endParaRPr lang="en-US" dirty="0"/>
           </a:p>
@@ -1986,7 +1986,7 @@
           <a:p>
             <a:fld id="{5DB4ED54-5B5E-4A04-93D3-5772E3CE3818}" type="datetime1">
               <a:rPr lang="en-US" smtClean="0"/>
-              <a:t>9/22/20</a:t>
+              <a:t>8/8/22</a:t>
             </a:fld>
             <a:endParaRPr lang="en-US" dirty="0"/>
           </a:p>
@@ -2099,7 +2099,7 @@
           <a:p>
             <a:fld id="{4EDE50D6-574B-40AF-946F-D52A04ADE379}" type="datetime1">
               <a:rPr lang="en-US" smtClean="0"/>
-              <a:t>9/22/20</a:t>
+              <a:t>8/8/22</a:t>
             </a:fld>
             <a:endParaRPr lang="en-US" dirty="0"/>
           </a:p>
@@ -2410,7 +2410,7 @@
           <a:p>
             <a:fld id="{D82884F1-FFEA-405F-9602-3DCA865EDA4E}" type="datetime1">
               <a:rPr lang="en-US" smtClean="0"/>
-              <a:t>9/22/20</a:t>
+              <a:t>8/8/22</a:t>
             </a:fld>
             <a:endParaRPr lang="en-US" dirty="0"/>
           </a:p>
@@ -2699,7 +2699,7 @@
           <a:p>
             <a:fld id="{ED291B17-9318-49DB-B28B-6E5994AE9581}" type="datetime1">
               <a:rPr lang="en-US" smtClean="0"/>
-              <a:t>9/22/20</a:t>
+              <a:t>8/8/22</a:t>
             </a:fld>
             <a:endParaRPr lang="en-US" dirty="0"/>
           </a:p>
@@ -2941,7 +2941,7 @@
           <a:p>
             <a:fld id="{ED291B17-9318-49DB-B28B-6E5994AE9581}" type="datetime1">
               <a:rPr lang="en-US" smtClean="0"/>
-              <a:t>9/22/20</a:t>
+              <a:t>8/8/22</a:t>
             </a:fld>
             <a:endParaRPr lang="en-US" dirty="0"/>
           </a:p>
@@ -10715,8 +10715,12 @@
               <a:t>    </a:t>
             </a:r>
             <a:r>
+              <a:rPr lang="en-US" b="1" dirty="0"/>
+              <a:t>for</a:t>
+            </a:r>
+            <a:r>
               <a:rPr lang="en-US" dirty="0"/>
-              <a:t>for </a:t>
+              <a:t> </a:t>
             </a:r>
             <a:r>
               <a:rPr lang="en-US" dirty="0" err="1"/>

</xml_diff>